<commit_message>
Release 1, Version Dec 10, 2021
Updated documentation for Release 1
</commit_message>
<xml_diff>
--- a/doc/models/rsrafvp app preview.pptx
+++ b/doc/models/rsrafvp app preview.pptx
@@ -236,7 +236,7 @@
           <a:p>
             <a:fld id="{DDB86C72-155B-4690-8C5A-89D96B2EC1A8}" type="datetimeFigureOut">
               <a:rPr lang="en-US" smtClean="0"/>
-              <a:t>10/10/2021</a:t>
+              <a:t>12/9/2021</a:t>
             </a:fld>
             <a:endParaRPr lang="en-US"/>
           </a:p>
@@ -650,7 +650,7 @@
           <a:p>
             <a:fld id="{E5283805-8F02-4078-B665-2A442B33B9B8}" type="datetime1">
               <a:rPr lang="en-US" smtClean="0"/>
-              <a:t>10/10/2021</a:t>
+              <a:t>12/9/2021</a:t>
             </a:fld>
             <a:endParaRPr lang="en-US"/>
           </a:p>
@@ -848,7 +848,7 @@
           <a:p>
             <a:fld id="{1F0A435A-6C88-4043-A18C-FBF8B21EE6AE}" type="datetime1">
               <a:rPr lang="en-US" smtClean="0"/>
-              <a:t>10/10/2021</a:t>
+              <a:t>12/9/2021</a:t>
             </a:fld>
             <a:endParaRPr lang="en-US"/>
           </a:p>
@@ -1056,7 +1056,7 @@
           <a:p>
             <a:fld id="{F22D5B6C-2154-4CBE-B31A-A894A68899FF}" type="datetime1">
               <a:rPr lang="en-US" smtClean="0"/>
-              <a:t>10/10/2021</a:t>
+              <a:t>12/9/2021</a:t>
             </a:fld>
             <a:endParaRPr lang="en-US"/>
           </a:p>
@@ -1254,7 +1254,7 @@
           <a:p>
             <a:fld id="{D914FC2A-B9AA-4029-8FBA-D6D99D3F5939}" type="datetime1">
               <a:rPr lang="en-US" smtClean="0"/>
-              <a:t>10/10/2021</a:t>
+              <a:t>12/9/2021</a:t>
             </a:fld>
             <a:endParaRPr lang="en-US"/>
           </a:p>
@@ -1529,7 +1529,7 @@
           <a:p>
             <a:fld id="{D5D87CDB-5550-458F-99B8-CE10FC10378F}" type="datetime1">
               <a:rPr lang="en-US" smtClean="0"/>
-              <a:t>10/10/2021</a:t>
+              <a:t>12/9/2021</a:t>
             </a:fld>
             <a:endParaRPr lang="en-US"/>
           </a:p>
@@ -1794,7 +1794,7 @@
           <a:p>
             <a:fld id="{ACE86605-3701-4B01-84CE-1B8D4EB6E248}" type="datetime1">
               <a:rPr lang="en-US" smtClean="0"/>
-              <a:t>10/10/2021</a:t>
+              <a:t>12/9/2021</a:t>
             </a:fld>
             <a:endParaRPr lang="en-US"/>
           </a:p>
@@ -2206,7 +2206,7 @@
           <a:p>
             <a:fld id="{DF936259-A405-4CBE-82A0-362D3DB5F0B6}" type="datetime1">
               <a:rPr lang="en-US" smtClean="0"/>
-              <a:t>10/10/2021</a:t>
+              <a:t>12/9/2021</a:t>
             </a:fld>
             <a:endParaRPr lang="en-US"/>
           </a:p>
@@ -2347,7 +2347,7 @@
           <a:p>
             <a:fld id="{46A257BA-2E35-4D2F-B166-D6BB12B548F7}" type="datetime1">
               <a:rPr lang="en-US" smtClean="0"/>
-              <a:t>10/10/2021</a:t>
+              <a:t>12/9/2021</a:t>
             </a:fld>
             <a:endParaRPr lang="en-US"/>
           </a:p>
@@ -2460,7 +2460,7 @@
           <a:p>
             <a:fld id="{B41A7114-D9D6-4A1D-BFD5-0576E2AF848B}" type="datetime1">
               <a:rPr lang="en-US" smtClean="0"/>
-              <a:t>10/10/2021</a:t>
+              <a:t>12/9/2021</a:t>
             </a:fld>
             <a:endParaRPr lang="en-US"/>
           </a:p>
@@ -2771,7 +2771,7 @@
           <a:p>
             <a:fld id="{E76BF11F-B8F2-4A29-8BED-3C2A4C3CB490}" type="datetime1">
               <a:rPr lang="en-US" smtClean="0"/>
-              <a:t>10/10/2021</a:t>
+              <a:t>12/9/2021</a:t>
             </a:fld>
             <a:endParaRPr lang="en-US"/>
           </a:p>
@@ -3059,7 +3059,7 @@
           <a:p>
             <a:fld id="{1EA4F45E-6F9A-4CE1-9708-17D6F8EF0A9B}" type="datetime1">
               <a:rPr lang="en-US" smtClean="0"/>
-              <a:t>10/10/2021</a:t>
+              <a:t>12/9/2021</a:t>
             </a:fld>
             <a:endParaRPr lang="en-US"/>
           </a:p>
@@ -3300,7 +3300,7 @@
           <a:p>
             <a:fld id="{7F6574FE-93CF-426D-90D9-C3B5A203BCD8}" type="datetime1">
               <a:rPr lang="en-US" smtClean="0"/>
-              <a:t>10/10/2021</a:t>
+              <a:t>12/9/2021</a:t>
             </a:fld>
             <a:endParaRPr lang="en-US"/>
           </a:p>
@@ -3808,8 +3808,8 @@
         </p:nvSpPr>
         <p:spPr>
           <a:xfrm>
-            <a:off x="2621280" y="2967335"/>
-            <a:ext cx="6949440" cy="923330"/>
+            <a:off x="609600" y="371475"/>
+            <a:ext cx="10991850" cy="5829297"/>
           </a:xfrm>
           <a:prstGeom prst="rect">
             <a:avLst/>
@@ -3818,15 +3818,153 @@
         </p:spPr>
         <p:txBody>
           <a:bodyPr wrap="square" rtlCol="0">
-            <a:spAutoFit/>
+            <a:noAutofit/>
           </a:bodyPr>
           <a:lstStyle/>
           <a:p>
+            <a:pPr marL="0" marR="0" algn="ctr">
+              <a:lnSpc>
+                <a:spcPct val="150000"/>
+              </a:lnSpc>
+            </a:pPr>
+            <a:r>
+              <a:rPr lang="en-US" sz="2800" dirty="0">
+                <a:effectLst/>
+                <a:ea typeface="Arial" panose="020B0604020202020204" pitchFamily="34" charset="0"/>
+              </a:rPr>
+              <a:t>Revised Self-Report Assessment of </a:t>
+            </a:r>
+          </a:p>
+          <a:p>
+            <a:pPr marL="0" marR="0" algn="ctr">
+              <a:lnSpc>
+                <a:spcPct val="150000"/>
+              </a:lnSpc>
+            </a:pPr>
+            <a:r>
+              <a:rPr lang="en-US" sz="2800" dirty="0">
+                <a:effectLst/>
+                <a:ea typeface="Arial" panose="020B0604020202020204" pitchFamily="34" charset="0"/>
+              </a:rPr>
+              <a:t>Functional Visual Performance</a:t>
+            </a:r>
+          </a:p>
+          <a:p>
+            <a:pPr marL="0" marR="0" algn="ctr">
+              <a:lnSpc>
+                <a:spcPct val="150000"/>
+              </a:lnSpc>
+            </a:pPr>
+            <a:r>
+              <a:rPr lang="en-US" sz="2800" dirty="0">
+                <a:effectLst/>
+                <a:ea typeface="Arial" panose="020B0604020202020204" pitchFamily="34" charset="0"/>
+              </a:rPr>
+              <a:t>(R-SRAFVP) Application</a:t>
+            </a:r>
+          </a:p>
+          <a:p>
+            <a:pPr marL="0" marR="0" algn="ctr"/>
+            <a:endParaRPr lang="en-US" dirty="0">
+              <a:effectLst/>
+              <a:ea typeface="Arial" panose="020B0604020202020204" pitchFamily="34" charset="0"/>
+            </a:endParaRPr>
+          </a:p>
+          <a:p>
+            <a:pPr marL="0" marR="0" algn="ctr"/>
+            <a:endParaRPr lang="en-US" dirty="0">
+              <a:effectLst/>
+              <a:ea typeface="Arial" panose="020B0604020202020204" pitchFamily="34" charset="0"/>
+            </a:endParaRPr>
+          </a:p>
+          <a:p>
             <a:pPr algn="ctr"/>
             <a:r>
-              <a:rPr lang="en-US" sz="5400" b="1" dirty="0"/>
+              <a:rPr lang="en-US" sz="3200" dirty="0"/>
               <a:t>R-SRAFVP App Preview</a:t>
             </a:r>
+          </a:p>
+          <a:p>
+            <a:pPr algn="ctr"/>
+            <a:endParaRPr lang="en-US" dirty="0"/>
+          </a:p>
+          <a:p>
+            <a:pPr algn="ctr"/>
+            <a:endParaRPr lang="en-US" dirty="0"/>
+          </a:p>
+          <a:p>
+            <a:pPr algn="ctr"/>
+            <a:endParaRPr lang="en-US" dirty="0"/>
+          </a:p>
+          <a:p>
+            <a:pPr marL="0" marR="0" algn="ctr">
+              <a:lnSpc>
+                <a:spcPct val="150000"/>
+              </a:lnSpc>
+            </a:pPr>
+            <a:r>
+              <a:rPr lang="en-US" dirty="0">
+                <a:effectLst/>
+                <a:ea typeface="Arial" panose="020B0604020202020204" pitchFamily="34" charset="0"/>
+              </a:rPr>
+              <a:t>Kirk Hedlich</a:t>
+            </a:r>
+          </a:p>
+          <a:p>
+            <a:pPr marL="0" marR="0" algn="ctr">
+              <a:lnSpc>
+                <a:spcPct val="150000"/>
+              </a:lnSpc>
+            </a:pPr>
+            <a:r>
+              <a:rPr lang="en-US" dirty="0">
+                <a:effectLst/>
+                <a:ea typeface="Arial" panose="020B0604020202020204" pitchFamily="34" charset="0"/>
+              </a:rPr>
+              <a:t>Dr. Byron DeVries</a:t>
+            </a:r>
+          </a:p>
+          <a:p>
+            <a:pPr algn="ctr">
+              <a:lnSpc>
+                <a:spcPct val="150000"/>
+              </a:lnSpc>
+            </a:pPr>
+            <a:r>
+              <a:rPr lang="en-US" dirty="0">
+                <a:sym typeface="Arial"/>
+              </a:rPr>
+              <a:t>CIS693 </a:t>
+            </a:r>
+            <a:r>
+              <a:rPr lang="en-US">
+                <a:sym typeface="Arial"/>
+              </a:rPr>
+              <a:t>Final Project</a:t>
+            </a:r>
+            <a:r>
+              <a:rPr lang="en-US"/>
+              <a:t>, </a:t>
+            </a:r>
+            <a:r>
+              <a:rPr lang="en-US" dirty="0"/>
+              <a:t>Fall 2021</a:t>
+            </a:r>
+          </a:p>
+          <a:p>
+            <a:pPr marL="0" marR="0" algn="ctr">
+              <a:lnSpc>
+                <a:spcPct val="150000"/>
+              </a:lnSpc>
+            </a:pPr>
+            <a:r>
+              <a:rPr lang="en-US" dirty="0">
+                <a:effectLst/>
+                <a:ea typeface="Arial" panose="020B0604020202020204" pitchFamily="34" charset="0"/>
+              </a:rPr>
+              <a:t>Grand Valley State University</a:t>
+            </a:r>
+            <a:endParaRPr lang="en-US" dirty="0"/>
           </a:p>
         </p:txBody>
       </p:sp>
@@ -8118,8 +8256,8 @@
             <a:chExt cx="1828800" cy="1314865"/>
           </a:xfrm>
         </p:grpSpPr>
-        <mc:AlternateContent xmlns:mc="http://schemas.openxmlformats.org/markup-compatibility/2006">
-          <mc:Choice xmlns:pslz="http://schemas.microsoft.com/office/powerpoint/2016/slidezoom" Requires="pslz">
+        <mc:AlternateContent xmlns:mc="http://schemas.openxmlformats.org/markup-compatibility/2006" xmlns:pslz="http://schemas.microsoft.com/office/powerpoint/2016/slidezoom">
+          <mc:Choice Requires="pslz">
             <p:graphicFrame>
               <p:nvGraphicFramePr>
                 <p:cNvPr id="27" name="Slide Zoom 26">
@@ -8176,7 +8314,7 @@
               </a:graphic>
             </p:graphicFrame>
           </mc:Choice>
-          <mc:Fallback>
+          <mc:Fallback xmlns="">
             <p:pic>
               <p:nvPicPr>
                 <p:cNvPr id="27" name="Slide Zoom 26">
@@ -8193,7 +8331,7 @@
                 <p:nvPr/>
               </p:nvPicPr>
               <p:blipFill>
-                <a:blip r:embed="rId35"/>
+                <a:blip r:embed="rId37"/>
                 <a:stretch>
                   <a:fillRect/>
                 </a:stretch>
@@ -8271,8 +8409,8 @@
             <a:chExt cx="1828800" cy="1305971"/>
           </a:xfrm>
         </p:grpSpPr>
-        <mc:AlternateContent xmlns:mc="http://schemas.openxmlformats.org/markup-compatibility/2006">
-          <mc:Choice xmlns:pslz="http://schemas.microsoft.com/office/powerpoint/2016/slidezoom" Requires="pslz">
+        <mc:AlternateContent xmlns:mc="http://schemas.openxmlformats.org/markup-compatibility/2006" xmlns:pslz="http://schemas.microsoft.com/office/powerpoint/2016/slidezoom">
+          <mc:Choice Requires="pslz">
             <p:graphicFrame>
               <p:nvGraphicFramePr>
                 <p:cNvPr id="29" name="Slide Zoom 28">
@@ -8303,7 +8441,7 @@
                     <pslz:sldZmObj sldId="268" cId="4098812390">
                       <pslz:zmPr id="{6D14CE65-1D7D-44B0-B500-0DE54D0F501E}" returnToParent="0" transitionDur="1000">
                         <p166:blipFill xmlns:p166="http://schemas.microsoft.com/office/powerpoint/2016/6/main">
-                          <a:blip r:embed="rId37"/>
+                          <a:blip r:embed="rId38"/>
                           <a:stretch>
                             <a:fillRect/>
                           </a:stretch>
@@ -8329,11 +8467,11 @@
               </a:graphic>
             </p:graphicFrame>
           </mc:Choice>
-          <mc:Fallback>
+          <mc:Fallback xmlns="">
             <p:pic>
               <p:nvPicPr>
                 <p:cNvPr id="29" name="Slide Zoom 28">
-                  <a:hlinkClick r:id="rId38" action="ppaction://hlinksldjump"/>
+                  <a:hlinkClick r:id="rId39" action="ppaction://hlinksldjump"/>
                   <a:extLst>
                     <a:ext uri="{FF2B5EF4-FFF2-40B4-BE49-F238E27FC236}">
                       <a16:creationId xmlns:a16="http://schemas.microsoft.com/office/drawing/2014/main" id="{E334356E-F66B-4C34-95BD-26186684772E}"/>
@@ -8346,7 +8484,7 @@
                 <p:nvPr/>
               </p:nvPicPr>
               <p:blipFill>
-                <a:blip r:embed="rId37"/>
+                <a:blip r:embed="rId40"/>
                 <a:stretch>
                   <a:fillRect/>
                 </a:stretch>
@@ -8456,7 +8594,7 @@
                     <pslz:sldZmObj sldId="269" cId="3159765545">
                       <pslz:zmPr id="{CD4071C7-E9D7-41EB-9100-A763354DCC70}" returnToParent="0" transitionDur="1000">
                         <p166:blipFill xmlns:p166="http://schemas.microsoft.com/office/powerpoint/2016/6/main">
-                          <a:blip r:embed="rId39"/>
+                          <a:blip r:embed="rId41"/>
                           <a:stretch>
                             <a:fillRect/>
                           </a:stretch>
@@ -8486,7 +8624,7 @@
             <p:pic>
               <p:nvPicPr>
                 <p:cNvPr id="31" name="Slide Zoom 30">
-                  <a:hlinkClick r:id="rId40" action="ppaction://hlinksldjump"/>
+                  <a:hlinkClick r:id="rId42" action="ppaction://hlinksldjump"/>
                   <a:extLst>
                     <a:ext uri="{FF2B5EF4-FFF2-40B4-BE49-F238E27FC236}">
                       <a16:creationId xmlns:a16="http://schemas.microsoft.com/office/drawing/2014/main" id="{0AAA66DB-4E05-4799-9687-203FB63CFCC7}"/>
@@ -8499,7 +8637,7 @@
                 <p:nvPr/>
               </p:nvPicPr>
               <p:blipFill>
-                <a:blip r:embed="rId41"/>
+                <a:blip r:embed="rId43"/>
                 <a:stretch>
                   <a:fillRect/>
                 </a:stretch>

</xml_diff>